<commit_message>
Corrección de una palabra
</commit_message>
<xml_diff>
--- a/El Abecedario.pptx
+++ b/El Abecedario.pptx
@@ -132,6 +132,11 @@
       </a:defRPr>
     </a:lvl9pPr>
   </p:defaultTextStyle>
+  <p:extLst>
+    <p:ext uri="{EFAFB233-063F-42B5-8137-9DF3F51BA10A}">
+      <p15:sldGuideLst xmlns:p15="http://schemas.microsoft.com/office/powerpoint/2012/main"/>
+    </p:ext>
+  </p:extLst>
 </p:presentation>
 </file>
 
@@ -538,7 +543,7 @@
           <a:p>
             <a:fld id="{D3CE8FCA-E89F-428D-A401-9E223A48248B}" type="datetimeFigureOut">
               <a:rPr lang="es-GT" smtClean="0"/>
-              <a:t>3/10/2021</a:t>
+              <a:t>26/10/2021</a:t>
             </a:fld>
             <a:endParaRPr lang="es-GT"/>
           </a:p>
@@ -717,7 +722,7 @@
           <a:p>
             <a:fld id="{D3CE8FCA-E89F-428D-A401-9E223A48248B}" type="datetimeFigureOut">
               <a:rPr lang="es-GT" smtClean="0"/>
-              <a:t>3/10/2021</a:t>
+              <a:t>26/10/2021</a:t>
             </a:fld>
             <a:endParaRPr lang="es-GT"/>
           </a:p>
@@ -897,7 +902,7 @@
           <a:p>
             <a:fld id="{D3CE8FCA-E89F-428D-A401-9E223A48248B}" type="datetimeFigureOut">
               <a:rPr lang="es-GT" smtClean="0"/>
-              <a:t>3/10/2021</a:t>
+              <a:t>26/10/2021</a:t>
             </a:fld>
             <a:endParaRPr lang="es-GT"/>
           </a:p>
@@ -1067,7 +1072,7 @@
           <a:p>
             <a:fld id="{D3CE8FCA-E89F-428D-A401-9E223A48248B}" type="datetimeFigureOut">
               <a:rPr lang="es-GT" smtClean="0"/>
-              <a:t>3/10/2021</a:t>
+              <a:t>26/10/2021</a:t>
             </a:fld>
             <a:endParaRPr lang="es-GT"/>
           </a:p>
@@ -1380,7 +1385,7 @@
           <a:p>
             <a:fld id="{D3CE8FCA-E89F-428D-A401-9E223A48248B}" type="datetimeFigureOut">
               <a:rPr lang="es-GT" smtClean="0"/>
-              <a:t>3/10/2021</a:t>
+              <a:t>26/10/2021</a:t>
             </a:fld>
             <a:endParaRPr lang="es-GT"/>
           </a:p>
@@ -1766,7 +1771,7 @@
           <a:p>
             <a:fld id="{D3CE8FCA-E89F-428D-A401-9E223A48248B}" type="datetimeFigureOut">
               <a:rPr lang="es-GT" smtClean="0"/>
-              <a:t>3/10/2021</a:t>
+              <a:t>26/10/2021</a:t>
             </a:fld>
             <a:endParaRPr lang="es-GT"/>
           </a:p>
@@ -2200,7 +2205,7 @@
           <a:p>
             <a:fld id="{D3CE8FCA-E89F-428D-A401-9E223A48248B}" type="datetimeFigureOut">
               <a:rPr lang="es-GT" smtClean="0"/>
-              <a:t>3/10/2021</a:t>
+              <a:t>26/10/2021</a:t>
             </a:fld>
             <a:endParaRPr lang="es-GT"/>
           </a:p>
@@ -2318,7 +2323,7 @@
           <a:p>
             <a:fld id="{D3CE8FCA-E89F-428D-A401-9E223A48248B}" type="datetimeFigureOut">
               <a:rPr lang="es-GT" smtClean="0"/>
-              <a:t>3/10/2021</a:t>
+              <a:t>26/10/2021</a:t>
             </a:fld>
             <a:endParaRPr lang="es-GT"/>
           </a:p>
@@ -2413,7 +2418,7 @@
           <a:p>
             <a:fld id="{D3CE8FCA-E89F-428D-A401-9E223A48248B}" type="datetimeFigureOut">
               <a:rPr lang="es-GT" smtClean="0"/>
-              <a:t>3/10/2021</a:t>
+              <a:t>26/10/2021</a:t>
             </a:fld>
             <a:endParaRPr lang="es-GT"/>
           </a:p>
@@ -2763,7 +2768,7 @@
           <a:p>
             <a:fld id="{D3CE8FCA-E89F-428D-A401-9E223A48248B}" type="datetimeFigureOut">
               <a:rPr lang="es-GT" smtClean="0"/>
-              <a:t>3/10/2021</a:t>
+              <a:t>26/10/2021</a:t>
             </a:fld>
             <a:endParaRPr lang="es-GT"/>
           </a:p>
@@ -3188,7 +3193,7 @@
           <a:p>
             <a:fld id="{D3CE8FCA-E89F-428D-A401-9E223A48248B}" type="datetimeFigureOut">
               <a:rPr lang="es-GT" smtClean="0"/>
-              <a:t>3/10/2021</a:t>
+              <a:t>26/10/2021</a:t>
             </a:fld>
             <a:endParaRPr lang="es-GT"/>
           </a:p>
@@ -3469,7 +3474,7 @@
           <a:p>
             <a:fld id="{D3CE8FCA-E89F-428D-A401-9E223A48248B}" type="datetimeFigureOut">
               <a:rPr lang="es-GT" smtClean="0"/>
-              <a:t>3/10/2021</a:t>
+              <a:t>26/10/2021</a:t>
             </a:fld>
             <a:endParaRPr lang="es-GT"/>
           </a:p>
@@ -6055,7 +6060,7 @@
           <a:p>
             <a:r>
               <a:rPr lang="es-GT" dirty="0"/>
-              <a:t>Sandilla   </a:t>
+              <a:t>Sandia  </a:t>
             </a:r>
           </a:p>
         </p:txBody>

</xml_diff>